<commit_message>
forgot to git my final project
Uploading the final copy
</commit_message>
<xml_diff>
--- a/erd.pptx
+++ b/erd.pptx
@@ -6,6 +6,7 @@
   </p:sldMasterIdLst>
   <p:sldIdLst>
     <p:sldId id="256" r:id="rId2"/>
+    <p:sldId id="257" r:id="rId3"/>
   </p:sldIdLst>
   <p:sldSz cx="9144000" cy="6858000" type="screen4x3"/>
   <p:notesSz cx="6858000" cy="9144000"/>
@@ -288,7 +289,7 @@
           <a:p>
             <a:fld id="{C50C667C-3A77-2040-B0F3-AE15DA422FD8}" type="datetimeFigureOut">
               <a:rPr lang="en-US" smtClean="0"/>
-              <a:t>11/30/14</a:t>
+              <a:t>12/3/14</a:t>
             </a:fld>
             <a:endParaRPr lang="en-US"/>
           </a:p>
@@ -458,7 +459,7 @@
           <a:p>
             <a:fld id="{C50C667C-3A77-2040-B0F3-AE15DA422FD8}" type="datetimeFigureOut">
               <a:rPr lang="en-US" smtClean="0"/>
-              <a:t>11/30/14</a:t>
+              <a:t>12/3/14</a:t>
             </a:fld>
             <a:endParaRPr lang="en-US"/>
           </a:p>
@@ -638,7 +639,7 @@
           <a:p>
             <a:fld id="{C50C667C-3A77-2040-B0F3-AE15DA422FD8}" type="datetimeFigureOut">
               <a:rPr lang="en-US" smtClean="0"/>
-              <a:t>11/30/14</a:t>
+              <a:t>12/3/14</a:t>
             </a:fld>
             <a:endParaRPr lang="en-US"/>
           </a:p>
@@ -808,7 +809,7 @@
           <a:p>
             <a:fld id="{C50C667C-3A77-2040-B0F3-AE15DA422FD8}" type="datetimeFigureOut">
               <a:rPr lang="en-US" smtClean="0"/>
-              <a:t>11/30/14</a:t>
+              <a:t>12/3/14</a:t>
             </a:fld>
             <a:endParaRPr lang="en-US"/>
           </a:p>
@@ -1054,7 +1055,7 @@
           <a:p>
             <a:fld id="{C50C667C-3A77-2040-B0F3-AE15DA422FD8}" type="datetimeFigureOut">
               <a:rPr lang="en-US" smtClean="0"/>
-              <a:t>11/30/14</a:t>
+              <a:t>12/3/14</a:t>
             </a:fld>
             <a:endParaRPr lang="en-US"/>
           </a:p>
@@ -1342,7 +1343,7 @@
           <a:p>
             <a:fld id="{C50C667C-3A77-2040-B0F3-AE15DA422FD8}" type="datetimeFigureOut">
               <a:rPr lang="en-US" smtClean="0"/>
-              <a:t>11/30/14</a:t>
+              <a:t>12/3/14</a:t>
             </a:fld>
             <a:endParaRPr lang="en-US"/>
           </a:p>
@@ -1764,7 +1765,7 @@
           <a:p>
             <a:fld id="{C50C667C-3A77-2040-B0F3-AE15DA422FD8}" type="datetimeFigureOut">
               <a:rPr lang="en-US" smtClean="0"/>
-              <a:t>11/30/14</a:t>
+              <a:t>12/3/14</a:t>
             </a:fld>
             <a:endParaRPr lang="en-US"/>
           </a:p>
@@ -1882,7 +1883,7 @@
           <a:p>
             <a:fld id="{C50C667C-3A77-2040-B0F3-AE15DA422FD8}" type="datetimeFigureOut">
               <a:rPr lang="en-US" smtClean="0"/>
-              <a:t>11/30/14</a:t>
+              <a:t>12/3/14</a:t>
             </a:fld>
             <a:endParaRPr lang="en-US"/>
           </a:p>
@@ -1977,7 +1978,7 @@
           <a:p>
             <a:fld id="{C50C667C-3A77-2040-B0F3-AE15DA422FD8}" type="datetimeFigureOut">
               <a:rPr lang="en-US" smtClean="0"/>
-              <a:t>11/30/14</a:t>
+              <a:t>12/3/14</a:t>
             </a:fld>
             <a:endParaRPr lang="en-US"/>
           </a:p>
@@ -2254,7 +2255,7 @@
           <a:p>
             <a:fld id="{C50C667C-3A77-2040-B0F3-AE15DA422FD8}" type="datetimeFigureOut">
               <a:rPr lang="en-US" smtClean="0"/>
-              <a:t>11/30/14</a:t>
+              <a:t>12/3/14</a:t>
             </a:fld>
             <a:endParaRPr lang="en-US"/>
           </a:p>
@@ -2507,7 +2508,7 @@
           <a:p>
             <a:fld id="{C50C667C-3A77-2040-B0F3-AE15DA422FD8}" type="datetimeFigureOut">
               <a:rPr lang="en-US" smtClean="0"/>
-              <a:t>11/30/14</a:t>
+              <a:t>12/3/14</a:t>
             </a:fld>
             <a:endParaRPr lang="en-US"/>
           </a:p>
@@ -2720,7 +2721,7 @@
           <a:p>
             <a:fld id="{C50C667C-3A77-2040-B0F3-AE15DA422FD8}" type="datetimeFigureOut">
               <a:rPr lang="en-US" smtClean="0"/>
-              <a:t>11/30/14</a:t>
+              <a:t>12/3/14</a:t>
             </a:fld>
             <a:endParaRPr lang="en-US"/>
           </a:p>
@@ -3104,7 +3105,7 @@
         <p:spPr>
           <a:xfrm>
             <a:off x="1098309" y="846702"/>
-            <a:ext cx="2013568" cy="1865033"/>
+            <a:ext cx="2013568" cy="2036662"/>
           </a:xfrm>
           <a:prstGeom prst="rect">
             <a:avLst/>
@@ -3160,8 +3161,24 @@
                   <a:schemeClr val="tx1"/>
                 </a:solidFill>
               </a:rPr>
-              <a:t>: Email</a:t>
-            </a:r>
+              <a:t>: ID</a:t>
+            </a:r>
+          </a:p>
+          <a:p>
+            <a:pPr algn="ctr"/>
+            <a:r>
+              <a:rPr lang="en-US" sz="1200" dirty="0" smtClean="0">
+                <a:solidFill>
+                  <a:schemeClr val="tx1"/>
+                </a:solidFill>
+              </a:rPr>
+              <a:t>Email</a:t>
+            </a:r>
+            <a:endParaRPr lang="en-US" sz="1200" dirty="0" smtClean="0">
+              <a:solidFill>
+                <a:schemeClr val="tx1"/>
+              </a:solidFill>
+            </a:endParaRPr>
           </a:p>
           <a:p>
             <a:pPr algn="ctr"/>
@@ -3242,7 +3259,15 @@
                   <a:schemeClr val="tx1"/>
                 </a:solidFill>
               </a:rPr>
-              <a:t>Drink Tips (</a:t>
+              <a:t>Party </a:t>
+            </a:r>
+            <a:r>
+              <a:rPr lang="en-US" sz="1200" dirty="0" smtClean="0">
+                <a:solidFill>
+                  <a:schemeClr val="tx1"/>
+                </a:solidFill>
+              </a:rPr>
+              <a:t>Tips (</a:t>
             </a:r>
             <a:r>
               <a:rPr lang="en-US" sz="1200" dirty="0" err="1" smtClean="0">
@@ -3269,7 +3294,7 @@
                   <a:schemeClr val="tx1"/>
                 </a:solidFill>
               </a:rPr>
-              <a:t>Low-Calorie (</a:t>
+              <a:t>Games(</a:t>
             </a:r>
             <a:r>
               <a:rPr lang="en-US" sz="1200" dirty="0" err="1" smtClean="0">
@@ -3303,7 +3328,7 @@
         </p:nvSpPr>
         <p:spPr>
           <a:xfrm>
-            <a:off x="5724032" y="1361590"/>
+            <a:off x="3710462" y="1487451"/>
             <a:ext cx="2013568" cy="1041214"/>
           </a:xfrm>
           <a:prstGeom prst="rect">
@@ -3360,26 +3385,15 @@
                   <a:schemeClr val="tx1"/>
                 </a:solidFill>
               </a:rPr>
-              <a:t>: Feedback ID</a:t>
-            </a:r>
-          </a:p>
-          <a:p>
-            <a:pPr algn="ctr"/>
-            <a:r>
-              <a:rPr lang="en-US" sz="1200" dirty="0" err="1" smtClean="0">
-                <a:solidFill>
-                  <a:schemeClr val="tx1"/>
-                </a:solidFill>
-              </a:rPr>
-              <a:t>Fk</a:t>
-            </a:r>
-            <a:r>
-              <a:rPr lang="en-US" sz="1200" dirty="0" smtClean="0">
-                <a:solidFill>
-                  <a:schemeClr val="tx1"/>
-                </a:solidFill>
-              </a:rPr>
-              <a:t>: Email</a:t>
+              <a:t>: Feedback </a:t>
+            </a:r>
+            <a:r>
+              <a:rPr lang="en-US" sz="1200" dirty="0" smtClean="0">
+                <a:solidFill>
+                  <a:schemeClr val="tx1"/>
+                </a:solidFill>
+              </a:rPr>
+              <a:t>ID</a:t>
             </a:r>
           </a:p>
           <a:p>
@@ -3392,6 +3406,22 @@
               </a:rPr>
               <a:t>Feedback Content</a:t>
             </a:r>
+          </a:p>
+          <a:p>
+            <a:pPr algn="ctr"/>
+            <a:r>
+              <a:rPr lang="en-US" sz="1200" dirty="0" smtClean="0">
+                <a:solidFill>
+                  <a:schemeClr val="tx1"/>
+                </a:solidFill>
+              </a:rPr>
+              <a:t>Rating</a:t>
+            </a:r>
+            <a:endParaRPr lang="en-US" sz="1200" dirty="0" smtClean="0">
+              <a:solidFill>
+                <a:schemeClr val="tx1"/>
+              </a:solidFill>
+            </a:endParaRPr>
           </a:p>
           <a:p>
             <a:pPr algn="ctr"/>
@@ -3492,15 +3522,7 @@
                   <a:schemeClr val="tx1"/>
                 </a:solidFill>
               </a:rPr>
-              <a:t> </a:t>
-            </a:r>
-            <a:r>
-              <a:rPr lang="en-US" sz="1200" dirty="0" smtClean="0">
-                <a:solidFill>
-                  <a:schemeClr val="tx1"/>
-                </a:solidFill>
-              </a:rPr>
-              <a:t>ID</a:t>
+              <a:t> ID</a:t>
             </a:r>
           </a:p>
           <a:p>
@@ -3602,15 +3624,7 @@
                   <a:schemeClr val="tx1"/>
                 </a:solidFill>
               </a:rPr>
-              <a:t> </a:t>
-            </a:r>
-            <a:r>
-              <a:rPr lang="en-US" sz="1200" dirty="0" smtClean="0">
-                <a:solidFill>
-                  <a:schemeClr val="tx1"/>
-                </a:solidFill>
-              </a:rPr>
-              <a:t>ID</a:t>
+              <a:t> ID</a:t>
             </a:r>
           </a:p>
           <a:p>
@@ -3715,306 +3729,84 @@
                   <a:schemeClr val="tx1"/>
                 </a:solidFill>
               </a:rPr>
-              <a:t>: Alcoholic </a:t>
-            </a:r>
-            <a:r>
-              <a:rPr lang="en-US" sz="1200" dirty="0" smtClean="0">
-                <a:solidFill>
-                  <a:schemeClr val="tx1"/>
-                </a:solidFill>
-              </a:rPr>
-              <a:t>Beverage ID</a:t>
+              <a:t>: Alcoholic Beverage ID</a:t>
+            </a:r>
+          </a:p>
+          <a:p>
+            <a:pPr algn="ctr"/>
+            <a:r>
+              <a:rPr lang="en-US" sz="1200" dirty="0" err="1" smtClean="0">
+                <a:solidFill>
+                  <a:schemeClr val="tx1"/>
+                </a:solidFill>
+              </a:rPr>
+              <a:t>Fk</a:t>
+            </a:r>
+            <a:r>
+              <a:rPr lang="en-US" sz="1200" dirty="0" smtClean="0">
+                <a:solidFill>
+                  <a:schemeClr val="tx1"/>
+                </a:solidFill>
+              </a:rPr>
+              <a:t>: Non-Alcoholic Beverage ID</a:t>
+            </a:r>
+          </a:p>
+          <a:p>
+            <a:pPr algn="ctr"/>
+            <a:r>
+              <a:rPr lang="en-US" sz="1200" dirty="0" smtClean="0">
+                <a:solidFill>
+                  <a:schemeClr val="tx1"/>
+                </a:solidFill>
+              </a:rPr>
+              <a:t>Cocktail Name</a:t>
+            </a:r>
+          </a:p>
+          <a:p>
+            <a:pPr algn="ctr"/>
+            <a:r>
+              <a:rPr lang="en-US" sz="1200" dirty="0" smtClean="0">
+                <a:solidFill>
+                  <a:schemeClr val="tx1"/>
+                </a:solidFill>
+              </a:rPr>
+              <a:t>Recipe</a:t>
+            </a:r>
+          </a:p>
+          <a:p>
+            <a:pPr algn="ctr"/>
+            <a:r>
+              <a:rPr lang="en-US" sz="1200" dirty="0" smtClean="0">
+                <a:solidFill>
+                  <a:schemeClr val="tx1"/>
+                </a:solidFill>
+              </a:rPr>
+              <a:t>Special </a:t>
+            </a:r>
+            <a:r>
+              <a:rPr lang="en-US" sz="1200" dirty="0" smtClean="0">
+                <a:solidFill>
+                  <a:schemeClr val="tx1"/>
+                </a:solidFill>
+              </a:rPr>
+              <a:t>Instructions</a:t>
+            </a:r>
+          </a:p>
+          <a:p>
+            <a:pPr algn="ctr"/>
+            <a:r>
+              <a:rPr lang="en-US" sz="1200" dirty="0" smtClean="0">
+                <a:solidFill>
+                  <a:schemeClr val="tx1"/>
+                </a:solidFill>
+              </a:rPr>
+              <a:t>Photo path</a:t>
             </a:r>
             <a:endParaRPr lang="en-US" sz="1200" dirty="0" smtClean="0">
               <a:solidFill>
                 <a:schemeClr val="tx1"/>
               </a:solidFill>
             </a:endParaRPr>
-          </a:p>
-          <a:p>
-            <a:pPr algn="ctr"/>
-            <a:r>
-              <a:rPr lang="en-US" sz="1200" dirty="0" err="1" smtClean="0">
-                <a:solidFill>
-                  <a:schemeClr val="tx1"/>
-                </a:solidFill>
-              </a:rPr>
-              <a:t>Fk</a:t>
-            </a:r>
-            <a:r>
-              <a:rPr lang="en-US" sz="1200" dirty="0" smtClean="0">
-                <a:solidFill>
-                  <a:schemeClr val="tx1"/>
-                </a:solidFill>
-              </a:rPr>
-              <a:t>: Non-Alcoholic </a:t>
-            </a:r>
-            <a:r>
-              <a:rPr lang="en-US" sz="1200" dirty="0" smtClean="0">
-                <a:solidFill>
-                  <a:schemeClr val="tx1"/>
-                </a:solidFill>
-              </a:rPr>
-              <a:t>Beverage ID</a:t>
-            </a:r>
-            <a:endParaRPr lang="en-US" sz="1200" dirty="0" smtClean="0">
-              <a:solidFill>
-                <a:schemeClr val="tx1"/>
-              </a:solidFill>
-            </a:endParaRPr>
-          </a:p>
-          <a:p>
-            <a:pPr algn="ctr"/>
-            <a:r>
-              <a:rPr lang="en-US" sz="1200" dirty="0" smtClean="0">
-                <a:solidFill>
-                  <a:schemeClr val="tx1"/>
-                </a:solidFill>
-              </a:rPr>
-              <a:t>Cocktail Name</a:t>
-            </a:r>
-          </a:p>
-          <a:p>
-            <a:pPr algn="ctr"/>
-            <a:r>
-              <a:rPr lang="en-US" sz="1200" dirty="0" smtClean="0">
-                <a:solidFill>
-                  <a:schemeClr val="tx1"/>
-                </a:solidFill>
-              </a:rPr>
-              <a:t>Recipe</a:t>
-            </a:r>
-          </a:p>
-          <a:p>
-            <a:pPr algn="ctr"/>
-            <a:r>
-              <a:rPr lang="en-US" sz="1200" dirty="0" smtClean="0">
-                <a:solidFill>
-                  <a:schemeClr val="tx1"/>
-                </a:solidFill>
-              </a:rPr>
-              <a:t>Special </a:t>
-            </a:r>
-            <a:r>
-              <a:rPr lang="en-US" sz="1200" dirty="0" smtClean="0">
-                <a:solidFill>
-                  <a:schemeClr val="tx1"/>
-                </a:solidFill>
-              </a:rPr>
-              <a:t>Instructions</a:t>
-            </a:r>
-            <a:endParaRPr lang="en-US" sz="1200" dirty="0" smtClean="0">
-              <a:solidFill>
-                <a:schemeClr val="tx1"/>
-              </a:solidFill>
-            </a:endParaRPr>
-          </a:p>
-        </p:txBody>
-      </p:sp>
-      <p:cxnSp>
-        <p:nvCxnSpPr>
-          <p:cNvPr id="9" name="Straight Connector 8"/>
-          <p:cNvCxnSpPr>
-            <a:stCxn id="2" idx="3"/>
-            <a:endCxn id="4" idx="1"/>
-          </p:cNvCxnSpPr>
-          <p:nvPr/>
-        </p:nvCxnSpPr>
-        <p:spPr>
-          <a:xfrm>
-            <a:off x="3111877" y="1779219"/>
-            <a:ext cx="2612155" cy="102978"/>
-          </a:xfrm>
-          <a:prstGeom prst="line">
-            <a:avLst/>
-          </a:prstGeom>
-          <a:ln>
-            <a:solidFill>
-              <a:schemeClr val="tx1"/>
-            </a:solidFill>
-          </a:ln>
-        </p:spPr>
-        <p:style>
-          <a:lnRef idx="2">
-            <a:schemeClr val="accent1"/>
-          </a:lnRef>
-          <a:fillRef idx="0">
-            <a:schemeClr val="accent1"/>
-          </a:fillRef>
-          <a:effectRef idx="1">
-            <a:schemeClr val="accent1"/>
-          </a:effectRef>
-          <a:fontRef idx="minor">
-            <a:schemeClr val="tx1"/>
-          </a:fontRef>
-        </p:style>
-      </p:cxnSp>
-      <p:cxnSp>
-        <p:nvCxnSpPr>
-          <p:cNvPr id="12" name="Straight Connector 11"/>
-          <p:cNvCxnSpPr/>
-          <p:nvPr/>
-        </p:nvCxnSpPr>
-        <p:spPr>
-          <a:xfrm flipH="1">
-            <a:off x="5525870" y="1756336"/>
-            <a:ext cx="198162" cy="125861"/>
-          </a:xfrm>
-          <a:prstGeom prst="line">
-            <a:avLst/>
-          </a:prstGeom>
-          <a:ln>
-            <a:solidFill>
-              <a:schemeClr val="tx1"/>
-            </a:solidFill>
-          </a:ln>
-        </p:spPr>
-        <p:style>
-          <a:lnRef idx="2">
-            <a:schemeClr val="accent1"/>
-          </a:lnRef>
-          <a:fillRef idx="0">
-            <a:schemeClr val="accent1"/>
-          </a:fillRef>
-          <a:effectRef idx="1">
-            <a:schemeClr val="accent1"/>
-          </a:effectRef>
-          <a:fontRef idx="minor">
-            <a:schemeClr val="tx1"/>
-          </a:fontRef>
-        </p:style>
-      </p:cxnSp>
-      <p:cxnSp>
-        <p:nvCxnSpPr>
-          <p:cNvPr id="13" name="Straight Connector 12"/>
-          <p:cNvCxnSpPr/>
-          <p:nvPr/>
-        </p:nvCxnSpPr>
-        <p:spPr>
-          <a:xfrm flipH="1" flipV="1">
-            <a:off x="5525870" y="1882197"/>
-            <a:ext cx="198162" cy="173218"/>
-          </a:xfrm>
-          <a:prstGeom prst="line">
-            <a:avLst/>
-          </a:prstGeom>
-          <a:ln>
-            <a:solidFill>
-              <a:schemeClr val="tx1"/>
-            </a:solidFill>
-          </a:ln>
-        </p:spPr>
-        <p:style>
-          <a:lnRef idx="2">
-            <a:schemeClr val="accent1"/>
-          </a:lnRef>
-          <a:fillRef idx="0">
-            <a:schemeClr val="accent1"/>
-          </a:fillRef>
-          <a:effectRef idx="1">
-            <a:schemeClr val="accent1"/>
-          </a:effectRef>
-          <a:fontRef idx="minor">
-            <a:schemeClr val="tx1"/>
-          </a:fontRef>
-        </p:style>
-      </p:cxnSp>
-      <p:cxnSp>
-        <p:nvCxnSpPr>
-          <p:cNvPr id="20" name="Straight Connector 19"/>
-          <p:cNvCxnSpPr/>
-          <p:nvPr/>
-        </p:nvCxnSpPr>
-        <p:spPr>
-          <a:xfrm>
-            <a:off x="3321481" y="1566749"/>
-            <a:ext cx="0" cy="424940"/>
-          </a:xfrm>
-          <a:prstGeom prst="line">
-            <a:avLst/>
-          </a:prstGeom>
-          <a:ln>
-            <a:solidFill>
-              <a:schemeClr val="tx1"/>
-            </a:solidFill>
-          </a:ln>
-        </p:spPr>
-        <p:style>
-          <a:lnRef idx="2">
-            <a:schemeClr val="accent1"/>
-          </a:lnRef>
-          <a:fillRef idx="0">
-            <a:schemeClr val="accent1"/>
-          </a:fillRef>
-          <a:effectRef idx="1">
-            <a:schemeClr val="accent1"/>
-          </a:effectRef>
-          <a:fontRef idx="minor">
-            <a:schemeClr val="tx1"/>
-          </a:fontRef>
-        </p:style>
-      </p:cxnSp>
-      <p:sp>
-        <p:nvSpPr>
-          <p:cNvPr id="22" name="TextBox 21"/>
-          <p:cNvSpPr txBox="1"/>
-          <p:nvPr/>
-        </p:nvSpPr>
-        <p:spPr>
-          <a:xfrm rot="161319">
-            <a:off x="3935611" y="1389856"/>
-            <a:ext cx="1213831" cy="369332"/>
-          </a:xfrm>
-          <a:prstGeom prst="rect">
-            <a:avLst/>
-          </a:prstGeom>
-          <a:noFill/>
-        </p:spPr>
-        <p:txBody>
-          <a:bodyPr wrap="none" rtlCol="0">
-            <a:spAutoFit/>
-          </a:bodyPr>
-          <a:lstStyle/>
-          <a:p>
-            <a:r>
-              <a:rPr lang="en-US" dirty="0"/>
-              <a:t>c</a:t>
-            </a:r>
-            <a:r>
-              <a:rPr lang="en-US" dirty="0" smtClean="0"/>
-              <a:t>an submit</a:t>
-            </a:r>
-            <a:endParaRPr lang="en-US" dirty="0"/>
-          </a:p>
-        </p:txBody>
-      </p:sp>
-      <p:sp>
-        <p:nvSpPr>
-          <p:cNvPr id="23" name="TextBox 22"/>
-          <p:cNvSpPr txBox="1"/>
-          <p:nvPr/>
-        </p:nvSpPr>
-        <p:spPr>
-          <a:xfrm rot="161319">
-            <a:off x="3669564" y="1870749"/>
-            <a:ext cx="1615985" cy="369332"/>
-          </a:xfrm>
-          <a:prstGeom prst="rect">
-            <a:avLst/>
-          </a:prstGeom>
-          <a:noFill/>
-        </p:spPr>
-        <p:txBody>
-          <a:bodyPr wrap="none" rtlCol="0">
-            <a:spAutoFit/>
-          </a:bodyPr>
-          <a:lstStyle/>
-          <a:p>
-            <a:r>
-              <a:rPr lang="en-US" dirty="0" smtClean="0"/>
-              <a:t>Is submitted by</a:t>
-            </a:r>
-            <a:endParaRPr lang="en-US" dirty="0"/>
           </a:p>
         </p:txBody>
       </p:sp>
@@ -4440,10 +4232,1619 @@
           </a:p>
         </p:txBody>
       </p:sp>
+      <p:sp>
+        <p:nvSpPr>
+          <p:cNvPr id="26" name="Rectangle 25"/>
+          <p:cNvSpPr/>
+          <p:nvPr/>
+        </p:nvSpPr>
+        <p:spPr>
+          <a:xfrm>
+            <a:off x="6490561" y="838915"/>
+            <a:ext cx="2013568" cy="1865033"/>
+          </a:xfrm>
+          <a:prstGeom prst="rect">
+            <a:avLst/>
+          </a:prstGeom>
+          <a:noFill/>
+          <a:ln w="12700" cmpd="sng">
+            <a:solidFill>
+              <a:schemeClr val="tx1"/>
+            </a:solidFill>
+          </a:ln>
+        </p:spPr>
+        <p:style>
+          <a:lnRef idx="1">
+            <a:schemeClr val="accent1"/>
+          </a:lnRef>
+          <a:fillRef idx="3">
+            <a:schemeClr val="accent1"/>
+          </a:fillRef>
+          <a:effectRef idx="2">
+            <a:schemeClr val="accent1"/>
+          </a:effectRef>
+          <a:fontRef idx="minor">
+            <a:schemeClr val="lt1"/>
+          </a:fontRef>
+        </p:style>
+        <p:txBody>
+          <a:bodyPr rtlCol="0" anchor="ctr"/>
+          <a:lstStyle/>
+          <a:p>
+            <a:pPr algn="ctr"/>
+            <a:r>
+              <a:rPr lang="en-US" u="sng" dirty="0" smtClean="0">
+                <a:solidFill>
+                  <a:schemeClr val="tx1"/>
+                </a:solidFill>
+              </a:rPr>
+              <a:t>Admin</a:t>
+            </a:r>
+            <a:endParaRPr lang="en-US" u="sng" dirty="0" smtClean="0">
+              <a:solidFill>
+                <a:schemeClr val="tx1"/>
+              </a:solidFill>
+            </a:endParaRPr>
+          </a:p>
+          <a:p>
+            <a:pPr algn="ctr"/>
+            <a:r>
+              <a:rPr lang="en-US" sz="1200" dirty="0" err="1" smtClean="0">
+                <a:solidFill>
+                  <a:schemeClr val="tx1"/>
+                </a:solidFill>
+              </a:rPr>
+              <a:t>Pmk</a:t>
+            </a:r>
+            <a:r>
+              <a:rPr lang="en-US" sz="1200" dirty="0" smtClean="0">
+                <a:solidFill>
+                  <a:schemeClr val="tx1"/>
+                </a:solidFill>
+              </a:rPr>
+              <a:t>: </a:t>
+            </a:r>
+            <a:r>
+              <a:rPr lang="en-US" sz="1200" dirty="0" smtClean="0">
+                <a:solidFill>
+                  <a:schemeClr val="tx1"/>
+                </a:solidFill>
+              </a:rPr>
+              <a:t>ID</a:t>
+            </a:r>
+            <a:endParaRPr lang="en-US" sz="1200" dirty="0" smtClean="0">
+              <a:solidFill>
+                <a:schemeClr val="tx1"/>
+              </a:solidFill>
+            </a:endParaRPr>
+          </a:p>
+          <a:p>
+            <a:pPr algn="ctr"/>
+            <a:r>
+              <a:rPr lang="en-US" sz="1200" dirty="0" smtClean="0">
+                <a:solidFill>
+                  <a:schemeClr val="tx1"/>
+                </a:solidFill>
+              </a:rPr>
+              <a:t>Username</a:t>
+            </a:r>
+            <a:endParaRPr lang="en-US" sz="1200" dirty="0" smtClean="0">
+              <a:solidFill>
+                <a:schemeClr val="tx1"/>
+              </a:solidFill>
+            </a:endParaRPr>
+          </a:p>
+          <a:p>
+            <a:pPr algn="ctr"/>
+            <a:r>
+              <a:rPr lang="en-US" sz="1200" dirty="0" smtClean="0">
+                <a:solidFill>
+                  <a:schemeClr val="tx1"/>
+                </a:solidFill>
+              </a:rPr>
+              <a:t>Password</a:t>
+            </a:r>
+            <a:endParaRPr lang="en-US" sz="1200" dirty="0" smtClean="0">
+              <a:solidFill>
+                <a:schemeClr val="tx1"/>
+              </a:solidFill>
+            </a:endParaRPr>
+          </a:p>
+          <a:p>
+            <a:pPr algn="ctr"/>
+            <a:r>
+              <a:rPr lang="en-US" sz="1200" dirty="0" smtClean="0">
+                <a:solidFill>
+                  <a:schemeClr val="tx1"/>
+                </a:solidFill>
+              </a:rPr>
+              <a:t>Admin (</a:t>
+            </a:r>
+            <a:r>
+              <a:rPr lang="en-US" sz="1200" dirty="0" err="1" smtClean="0">
+                <a:solidFill>
+                  <a:schemeClr val="tx1"/>
+                </a:solidFill>
+              </a:rPr>
+              <a:t>boolean</a:t>
+            </a:r>
+            <a:r>
+              <a:rPr lang="en-US" sz="1200" dirty="0" smtClean="0">
+                <a:solidFill>
+                  <a:schemeClr val="tx1"/>
+                </a:solidFill>
+              </a:rPr>
+              <a:t>)</a:t>
+            </a:r>
+            <a:endParaRPr lang="en-US" sz="1200" dirty="0">
+              <a:solidFill>
+                <a:schemeClr val="tx1"/>
+              </a:solidFill>
+            </a:endParaRPr>
+          </a:p>
+        </p:txBody>
+      </p:sp>
     </p:spTree>
     <p:extLst>
       <p:ext uri="{BB962C8B-B14F-4D97-AF65-F5344CB8AC3E}">
         <p14:creationId xmlns:p14="http://schemas.microsoft.com/office/powerpoint/2010/main" val="3370407376"/>
+      </p:ext>
+    </p:extLst>
+  </p:cSld>
+  <p:clrMapOvr>
+    <a:masterClrMapping/>
+  </p:clrMapOvr>
+</p:sld>
+</file>
+
+<file path=ppt/slides/slide2.xml><?xml version="1.0" encoding="utf-8"?>
+<p:sld xmlns:a="http://schemas.openxmlformats.org/drawingml/2006/main" xmlns:r="http://schemas.openxmlformats.org/officeDocument/2006/relationships" xmlns:p="http://schemas.openxmlformats.org/presentationml/2006/main">
+  <p:cSld>
+    <p:spTree>
+      <p:nvGrpSpPr>
+        <p:cNvPr id="1" name=""/>
+        <p:cNvGrpSpPr/>
+        <p:nvPr/>
+      </p:nvGrpSpPr>
+      <p:grpSpPr>
+        <a:xfrm>
+          <a:off x="0" y="0"/>
+          <a:ext cx="0" cy="0"/>
+          <a:chOff x="0" y="0"/>
+          <a:chExt cx="0" cy="0"/>
+        </a:xfrm>
+      </p:grpSpPr>
+      <p:sp>
+        <p:nvSpPr>
+          <p:cNvPr id="4" name="Rectangle 3"/>
+          <p:cNvSpPr/>
+          <p:nvPr/>
+        </p:nvSpPr>
+        <p:spPr>
+          <a:xfrm>
+            <a:off x="3375013" y="343258"/>
+            <a:ext cx="2013568" cy="766609"/>
+          </a:xfrm>
+          <a:prstGeom prst="rect">
+            <a:avLst/>
+          </a:prstGeom>
+          <a:noFill/>
+          <a:ln w="12700" cmpd="sng">
+            <a:solidFill>
+              <a:schemeClr val="tx1"/>
+            </a:solidFill>
+          </a:ln>
+        </p:spPr>
+        <p:style>
+          <a:lnRef idx="1">
+            <a:schemeClr val="accent1"/>
+          </a:lnRef>
+          <a:fillRef idx="3">
+            <a:schemeClr val="accent1"/>
+          </a:fillRef>
+          <a:effectRef idx="2">
+            <a:schemeClr val="accent1"/>
+          </a:effectRef>
+          <a:fontRef idx="minor">
+            <a:schemeClr val="lt1"/>
+          </a:fontRef>
+        </p:style>
+        <p:txBody>
+          <a:bodyPr rtlCol="0" anchor="ctr"/>
+          <a:lstStyle/>
+          <a:p>
+            <a:pPr algn="ctr"/>
+            <a:r>
+              <a:rPr lang="en-US" u="sng" dirty="0" err="1" smtClean="0">
+                <a:solidFill>
+                  <a:schemeClr val="tx1"/>
+                </a:solidFill>
+              </a:rPr>
+              <a:t>head.ph</a:t>
+            </a:r>
+            <a:r>
+              <a:rPr lang="en-US" u="sng" dirty="0" err="1" smtClean="0">
+                <a:solidFill>
+                  <a:schemeClr val="tx1"/>
+                </a:solidFill>
+              </a:rPr>
+              <a:t>p</a:t>
+            </a:r>
+            <a:endParaRPr lang="en-US" u="sng" dirty="0" smtClean="0">
+              <a:solidFill>
+                <a:schemeClr val="tx1"/>
+              </a:solidFill>
+            </a:endParaRPr>
+          </a:p>
+          <a:p>
+            <a:pPr algn="ctr"/>
+            <a:r>
+              <a:rPr lang="en-US" sz="1200" dirty="0">
+                <a:solidFill>
+                  <a:schemeClr val="tx1"/>
+                </a:solidFill>
+              </a:rPr>
+              <a:t>m</a:t>
+            </a:r>
+            <a:r>
+              <a:rPr lang="en-US" sz="1200" dirty="0" smtClean="0">
+                <a:solidFill>
+                  <a:schemeClr val="tx1"/>
+                </a:solidFill>
+              </a:rPr>
+              <a:t>eta info</a:t>
+            </a:r>
+          </a:p>
+          <a:p>
+            <a:pPr algn="ctr"/>
+            <a:r>
+              <a:rPr lang="en-US" sz="1200" dirty="0" err="1" smtClean="0">
+                <a:solidFill>
+                  <a:schemeClr val="tx1"/>
+                </a:solidFill>
+              </a:rPr>
+              <a:t>nav</a:t>
+            </a:r>
+            <a:endParaRPr lang="en-US" sz="1200" dirty="0">
+              <a:solidFill>
+                <a:schemeClr val="tx1"/>
+              </a:solidFill>
+            </a:endParaRPr>
+          </a:p>
+        </p:txBody>
+      </p:sp>
+      <p:sp>
+        <p:nvSpPr>
+          <p:cNvPr id="5" name="Rectangle 4"/>
+          <p:cNvSpPr/>
+          <p:nvPr/>
+        </p:nvSpPr>
+        <p:spPr>
+          <a:xfrm>
+            <a:off x="106635" y="1483318"/>
+            <a:ext cx="2139311" cy="1861378"/>
+          </a:xfrm>
+          <a:prstGeom prst="rect">
+            <a:avLst/>
+          </a:prstGeom>
+          <a:noFill/>
+          <a:ln w="12700" cmpd="sng">
+            <a:solidFill>
+              <a:schemeClr val="tx1"/>
+            </a:solidFill>
+          </a:ln>
+        </p:spPr>
+        <p:style>
+          <a:lnRef idx="1">
+            <a:schemeClr val="accent1"/>
+          </a:lnRef>
+          <a:fillRef idx="3">
+            <a:schemeClr val="accent1"/>
+          </a:fillRef>
+          <a:effectRef idx="2">
+            <a:schemeClr val="accent1"/>
+          </a:effectRef>
+          <a:fontRef idx="minor">
+            <a:schemeClr val="lt1"/>
+          </a:fontRef>
+        </p:style>
+        <p:txBody>
+          <a:bodyPr rtlCol="0" anchor="ctr"/>
+          <a:lstStyle/>
+          <a:p>
+            <a:pPr algn="ctr"/>
+            <a:r>
+              <a:rPr lang="en-US" u="sng" dirty="0" err="1" smtClean="0">
+                <a:solidFill>
+                  <a:schemeClr val="tx1"/>
+                </a:solidFill>
+              </a:rPr>
+              <a:t>index.php</a:t>
+            </a:r>
+            <a:endParaRPr lang="en-US" u="sng" dirty="0" smtClean="0">
+              <a:solidFill>
+                <a:schemeClr val="tx1"/>
+              </a:solidFill>
+            </a:endParaRPr>
+          </a:p>
+          <a:p>
+            <a:pPr algn="ctr"/>
+            <a:r>
+              <a:rPr lang="en-US" sz="1200" dirty="0" smtClean="0">
+                <a:solidFill>
+                  <a:schemeClr val="tx1"/>
+                </a:solidFill>
+              </a:rPr>
+              <a:t>&lt;</a:t>
+            </a:r>
+            <a:r>
+              <a:rPr lang="en-US" sz="1200" dirty="0" err="1" smtClean="0">
+                <a:solidFill>
+                  <a:schemeClr val="tx1"/>
+                </a:solidFill>
+              </a:rPr>
+              <a:t>nav</a:t>
+            </a:r>
+            <a:r>
+              <a:rPr lang="en-US" sz="1200" dirty="0" smtClean="0">
+                <a:solidFill>
+                  <a:schemeClr val="tx1"/>
+                </a:solidFill>
+              </a:rPr>
+              <a:t>&gt;</a:t>
+            </a:r>
+          </a:p>
+          <a:p>
+            <a:pPr algn="ctr"/>
+            <a:endParaRPr lang="en-US" sz="1200" dirty="0">
+              <a:solidFill>
+                <a:schemeClr val="tx1"/>
+              </a:solidFill>
+            </a:endParaRPr>
+          </a:p>
+          <a:p>
+            <a:pPr algn="ctr"/>
+            <a:r>
+              <a:rPr lang="en-US" sz="1200" dirty="0" smtClean="0">
+                <a:solidFill>
+                  <a:schemeClr val="tx1"/>
+                </a:solidFill>
+              </a:rPr>
+              <a:t>What are you drinking tonight?</a:t>
+            </a:r>
+          </a:p>
+          <a:p>
+            <a:pPr algn="ctr"/>
+            <a:endParaRPr lang="en-US" sz="1200" dirty="0">
+              <a:solidFill>
+                <a:schemeClr val="tx1"/>
+              </a:solidFill>
+            </a:endParaRPr>
+          </a:p>
+          <a:p>
+            <a:pPr algn="ctr"/>
+            <a:r>
+              <a:rPr lang="en-US" sz="1200" dirty="0" smtClean="0">
+                <a:solidFill>
+                  <a:schemeClr val="tx1"/>
+                </a:solidFill>
+              </a:rPr>
+              <a:t>Spirit:</a:t>
+            </a:r>
+          </a:p>
+          <a:p>
+            <a:pPr algn="ctr"/>
+            <a:r>
+              <a:rPr lang="en-US" sz="1200" dirty="0" smtClean="0">
+                <a:solidFill>
+                  <a:schemeClr val="tx1"/>
+                </a:solidFill>
+              </a:rPr>
+              <a:t>Mixer:</a:t>
+            </a:r>
+          </a:p>
+          <a:p>
+            <a:pPr algn="ctr"/>
+            <a:endParaRPr lang="en-US" sz="1200" dirty="0">
+              <a:solidFill>
+                <a:schemeClr val="tx1"/>
+              </a:solidFill>
+            </a:endParaRPr>
+          </a:p>
+          <a:p>
+            <a:pPr algn="ctr"/>
+            <a:r>
+              <a:rPr lang="en-US" sz="1200" dirty="0" smtClean="0">
+                <a:solidFill>
+                  <a:schemeClr val="tx1"/>
+                </a:solidFill>
+              </a:rPr>
+              <a:t>Bottoms Up!</a:t>
+            </a:r>
+            <a:endParaRPr lang="en-US" sz="1200" dirty="0">
+              <a:solidFill>
+                <a:schemeClr val="tx1"/>
+              </a:solidFill>
+            </a:endParaRPr>
+          </a:p>
+        </p:txBody>
+      </p:sp>
+      <p:sp>
+        <p:nvSpPr>
+          <p:cNvPr id="6" name="Rectangle 5"/>
+          <p:cNvSpPr/>
+          <p:nvPr/>
+        </p:nvSpPr>
+        <p:spPr>
+          <a:xfrm>
+            <a:off x="2927961" y="1906666"/>
+            <a:ext cx="1269960" cy="1113997"/>
+          </a:xfrm>
+          <a:prstGeom prst="rect">
+            <a:avLst/>
+          </a:prstGeom>
+          <a:noFill/>
+          <a:ln w="12700" cmpd="sng">
+            <a:solidFill>
+              <a:schemeClr val="tx1"/>
+            </a:solidFill>
+          </a:ln>
+        </p:spPr>
+        <p:style>
+          <a:lnRef idx="1">
+            <a:schemeClr val="accent1"/>
+          </a:lnRef>
+          <a:fillRef idx="3">
+            <a:schemeClr val="accent1"/>
+          </a:fillRef>
+          <a:effectRef idx="2">
+            <a:schemeClr val="accent1"/>
+          </a:effectRef>
+          <a:fontRef idx="minor">
+            <a:schemeClr val="lt1"/>
+          </a:fontRef>
+        </p:style>
+        <p:txBody>
+          <a:bodyPr rtlCol="0" anchor="ctr"/>
+          <a:lstStyle/>
+          <a:p>
+            <a:pPr algn="ctr"/>
+            <a:r>
+              <a:rPr lang="en-US" u="sng" dirty="0" err="1" smtClean="0">
+                <a:solidFill>
+                  <a:schemeClr val="tx1"/>
+                </a:solidFill>
+              </a:rPr>
+              <a:t>about.php</a:t>
+            </a:r>
+            <a:endParaRPr lang="en-US" u="sng" dirty="0" smtClean="0">
+              <a:solidFill>
+                <a:schemeClr val="tx1"/>
+              </a:solidFill>
+            </a:endParaRPr>
+          </a:p>
+          <a:p>
+            <a:pPr algn="ctr"/>
+            <a:r>
+              <a:rPr lang="en-US" sz="1200" dirty="0" smtClean="0">
+                <a:solidFill>
+                  <a:schemeClr val="tx1"/>
+                </a:solidFill>
+              </a:rPr>
+              <a:t>&lt;</a:t>
+            </a:r>
+            <a:r>
+              <a:rPr lang="en-US" sz="1200" dirty="0" err="1" smtClean="0">
+                <a:solidFill>
+                  <a:schemeClr val="tx1"/>
+                </a:solidFill>
+              </a:rPr>
+              <a:t>nav</a:t>
+            </a:r>
+            <a:r>
+              <a:rPr lang="en-US" sz="1200" dirty="0" smtClean="0">
+                <a:solidFill>
+                  <a:schemeClr val="tx1"/>
+                </a:solidFill>
+              </a:rPr>
+              <a:t>&gt;</a:t>
+            </a:r>
+          </a:p>
+          <a:p>
+            <a:pPr algn="ctr"/>
+            <a:endParaRPr lang="en-US" sz="1200" dirty="0">
+              <a:solidFill>
+                <a:schemeClr val="tx1"/>
+              </a:solidFill>
+            </a:endParaRPr>
+          </a:p>
+          <a:p>
+            <a:pPr algn="ctr"/>
+            <a:r>
+              <a:rPr lang="en-US" sz="1200" dirty="0" smtClean="0">
+                <a:solidFill>
+                  <a:schemeClr val="tx1"/>
+                </a:solidFill>
+              </a:rPr>
+              <a:t>About this site</a:t>
+            </a:r>
+          </a:p>
+          <a:p>
+            <a:pPr algn="ctr"/>
+            <a:r>
+              <a:rPr lang="en-US" sz="1200" dirty="0" smtClean="0">
+                <a:solidFill>
+                  <a:schemeClr val="tx1"/>
+                </a:solidFill>
+              </a:rPr>
+              <a:t>&lt;text&gt;&lt;photo&gt;</a:t>
+            </a:r>
+            <a:endParaRPr lang="en-US" sz="1200" dirty="0">
+              <a:solidFill>
+                <a:schemeClr val="tx1"/>
+              </a:solidFill>
+            </a:endParaRPr>
+          </a:p>
+        </p:txBody>
+      </p:sp>
+      <p:sp>
+        <p:nvSpPr>
+          <p:cNvPr id="7" name="Rectangle 6"/>
+          <p:cNvSpPr/>
+          <p:nvPr/>
+        </p:nvSpPr>
+        <p:spPr>
+          <a:xfrm>
+            <a:off x="4512406" y="1765710"/>
+            <a:ext cx="2036450" cy="1297067"/>
+          </a:xfrm>
+          <a:prstGeom prst="rect">
+            <a:avLst/>
+          </a:prstGeom>
+          <a:noFill/>
+          <a:ln w="12700" cmpd="sng">
+            <a:solidFill>
+              <a:schemeClr val="tx1"/>
+            </a:solidFill>
+          </a:ln>
+        </p:spPr>
+        <p:style>
+          <a:lnRef idx="1">
+            <a:schemeClr val="accent1"/>
+          </a:lnRef>
+          <a:fillRef idx="3">
+            <a:schemeClr val="accent1"/>
+          </a:fillRef>
+          <a:effectRef idx="2">
+            <a:schemeClr val="accent1"/>
+          </a:effectRef>
+          <a:fontRef idx="minor">
+            <a:schemeClr val="lt1"/>
+          </a:fontRef>
+        </p:style>
+        <p:txBody>
+          <a:bodyPr rtlCol="0" anchor="ctr"/>
+          <a:lstStyle/>
+          <a:p>
+            <a:pPr algn="ctr"/>
+            <a:r>
+              <a:rPr lang="en-US" u="sng" dirty="0" err="1" smtClean="0">
+                <a:solidFill>
+                  <a:schemeClr val="tx1"/>
+                </a:solidFill>
+              </a:rPr>
+              <a:t>signup.php</a:t>
+            </a:r>
+            <a:endParaRPr lang="en-US" u="sng" dirty="0" smtClean="0">
+              <a:solidFill>
+                <a:schemeClr val="tx1"/>
+              </a:solidFill>
+            </a:endParaRPr>
+          </a:p>
+          <a:p>
+            <a:pPr algn="ctr"/>
+            <a:r>
+              <a:rPr lang="en-US" sz="1200" dirty="0" smtClean="0">
+                <a:solidFill>
+                  <a:schemeClr val="tx1"/>
+                </a:solidFill>
+              </a:rPr>
+              <a:t>&lt;</a:t>
+            </a:r>
+            <a:r>
+              <a:rPr lang="en-US" sz="1200" dirty="0" err="1" smtClean="0">
+                <a:solidFill>
+                  <a:schemeClr val="tx1"/>
+                </a:solidFill>
+              </a:rPr>
+              <a:t>nav</a:t>
+            </a:r>
+            <a:r>
+              <a:rPr lang="en-US" sz="1200" dirty="0" smtClean="0">
+                <a:solidFill>
+                  <a:schemeClr val="tx1"/>
+                </a:solidFill>
+              </a:rPr>
+              <a:t>&gt;</a:t>
+            </a:r>
+          </a:p>
+          <a:p>
+            <a:pPr algn="ctr"/>
+            <a:endParaRPr lang="en-US" sz="1200" dirty="0">
+              <a:solidFill>
+                <a:schemeClr val="tx1"/>
+              </a:solidFill>
+            </a:endParaRPr>
+          </a:p>
+          <a:p>
+            <a:pPr algn="ctr"/>
+            <a:r>
+              <a:rPr lang="en-US" sz="1200" dirty="0" smtClean="0">
+                <a:solidFill>
+                  <a:schemeClr val="tx1"/>
+                </a:solidFill>
+              </a:rPr>
+              <a:t>Sign Up for Newsletter!</a:t>
+            </a:r>
+          </a:p>
+          <a:p>
+            <a:pPr algn="ctr"/>
+            <a:r>
+              <a:rPr lang="en-US" sz="1200" dirty="0" smtClean="0">
+                <a:solidFill>
+                  <a:schemeClr val="tx1"/>
+                </a:solidFill>
+              </a:rPr>
+              <a:t>&lt;form to submit information&gt;</a:t>
+            </a:r>
+          </a:p>
+          <a:p>
+            <a:pPr algn="ctr"/>
+            <a:r>
+              <a:rPr lang="en-US" sz="1200" dirty="0" smtClean="0">
+                <a:solidFill>
+                  <a:schemeClr val="tx1"/>
+                </a:solidFill>
+              </a:rPr>
+              <a:t>&lt;submit to user table&gt;</a:t>
+            </a:r>
+            <a:endParaRPr lang="en-US" sz="1200" dirty="0">
+              <a:solidFill>
+                <a:schemeClr val="tx1"/>
+              </a:solidFill>
+            </a:endParaRPr>
+          </a:p>
+        </p:txBody>
+      </p:sp>
+      <p:sp>
+        <p:nvSpPr>
+          <p:cNvPr id="8" name="Rectangle 7"/>
+          <p:cNvSpPr/>
+          <p:nvPr/>
+        </p:nvSpPr>
+        <p:spPr>
+          <a:xfrm>
+            <a:off x="7114123" y="1650814"/>
+            <a:ext cx="1908941" cy="1297067"/>
+          </a:xfrm>
+          <a:prstGeom prst="rect">
+            <a:avLst/>
+          </a:prstGeom>
+          <a:noFill/>
+          <a:ln w="12700" cmpd="sng">
+            <a:solidFill>
+              <a:schemeClr val="tx1"/>
+            </a:solidFill>
+          </a:ln>
+        </p:spPr>
+        <p:style>
+          <a:lnRef idx="1">
+            <a:schemeClr val="accent1"/>
+          </a:lnRef>
+          <a:fillRef idx="3">
+            <a:schemeClr val="accent1"/>
+          </a:fillRef>
+          <a:effectRef idx="2">
+            <a:schemeClr val="accent1"/>
+          </a:effectRef>
+          <a:fontRef idx="minor">
+            <a:schemeClr val="lt1"/>
+          </a:fontRef>
+        </p:style>
+        <p:txBody>
+          <a:bodyPr rtlCol="0" anchor="ctr"/>
+          <a:lstStyle/>
+          <a:p>
+            <a:pPr algn="ctr"/>
+            <a:r>
+              <a:rPr lang="en-US" u="sng" dirty="0" err="1" smtClean="0">
+                <a:solidFill>
+                  <a:schemeClr val="tx1"/>
+                </a:solidFill>
+              </a:rPr>
+              <a:t>feedback.php</a:t>
+            </a:r>
+            <a:endParaRPr lang="en-US" u="sng" dirty="0" smtClean="0">
+              <a:solidFill>
+                <a:schemeClr val="tx1"/>
+              </a:solidFill>
+            </a:endParaRPr>
+          </a:p>
+          <a:p>
+            <a:pPr algn="ctr"/>
+            <a:r>
+              <a:rPr lang="en-US" sz="1200" dirty="0" smtClean="0">
+                <a:solidFill>
+                  <a:schemeClr val="tx1"/>
+                </a:solidFill>
+              </a:rPr>
+              <a:t>&lt;</a:t>
+            </a:r>
+            <a:r>
+              <a:rPr lang="en-US" sz="1200" dirty="0" err="1" smtClean="0">
+                <a:solidFill>
+                  <a:schemeClr val="tx1"/>
+                </a:solidFill>
+              </a:rPr>
+              <a:t>nav</a:t>
+            </a:r>
+            <a:r>
+              <a:rPr lang="en-US" sz="1200" dirty="0" smtClean="0">
+                <a:solidFill>
+                  <a:schemeClr val="tx1"/>
+                </a:solidFill>
+              </a:rPr>
+              <a:t>&gt;</a:t>
+            </a:r>
+          </a:p>
+          <a:p>
+            <a:pPr algn="ctr"/>
+            <a:endParaRPr lang="en-US" sz="1200" dirty="0">
+              <a:solidFill>
+                <a:schemeClr val="tx1"/>
+              </a:solidFill>
+            </a:endParaRPr>
+          </a:p>
+          <a:p>
+            <a:pPr algn="ctr"/>
+            <a:r>
+              <a:rPr lang="en-US" sz="1200" dirty="0" smtClean="0">
+                <a:solidFill>
+                  <a:schemeClr val="tx1"/>
+                </a:solidFill>
+              </a:rPr>
+              <a:t>Leave Feedback!</a:t>
+            </a:r>
+          </a:p>
+          <a:p>
+            <a:pPr algn="ctr"/>
+            <a:r>
+              <a:rPr lang="en-US" sz="1200" dirty="0" smtClean="0">
+                <a:solidFill>
+                  <a:schemeClr val="tx1"/>
+                </a:solidFill>
+              </a:rPr>
+              <a:t>&lt;form to leave feedback&gt;</a:t>
+            </a:r>
+          </a:p>
+          <a:p>
+            <a:pPr algn="ctr"/>
+            <a:r>
+              <a:rPr lang="en-US" sz="1200" dirty="0" smtClean="0">
+                <a:solidFill>
+                  <a:schemeClr val="tx1"/>
+                </a:solidFill>
+              </a:rPr>
+              <a:t>&lt;submit to feedback table&gt;</a:t>
+            </a:r>
+            <a:endParaRPr lang="en-US" sz="1200" dirty="0">
+              <a:solidFill>
+                <a:schemeClr val="tx1"/>
+              </a:solidFill>
+            </a:endParaRPr>
+          </a:p>
+        </p:txBody>
+      </p:sp>
+      <p:sp>
+        <p:nvSpPr>
+          <p:cNvPr id="9" name="Rectangle 8"/>
+          <p:cNvSpPr/>
+          <p:nvPr/>
+        </p:nvSpPr>
+        <p:spPr>
+          <a:xfrm>
+            <a:off x="653955" y="3923620"/>
+            <a:ext cx="2147187" cy="1113997"/>
+          </a:xfrm>
+          <a:prstGeom prst="rect">
+            <a:avLst/>
+          </a:prstGeom>
+          <a:noFill/>
+          <a:ln w="12700" cmpd="sng">
+            <a:solidFill>
+              <a:schemeClr val="tx1"/>
+            </a:solidFill>
+          </a:ln>
+        </p:spPr>
+        <p:style>
+          <a:lnRef idx="1">
+            <a:schemeClr val="accent1"/>
+          </a:lnRef>
+          <a:fillRef idx="3">
+            <a:schemeClr val="accent1"/>
+          </a:fillRef>
+          <a:effectRef idx="2">
+            <a:schemeClr val="accent1"/>
+          </a:effectRef>
+          <a:fontRef idx="minor">
+            <a:schemeClr val="lt1"/>
+          </a:fontRef>
+        </p:style>
+        <p:txBody>
+          <a:bodyPr rtlCol="0" anchor="ctr"/>
+          <a:lstStyle/>
+          <a:p>
+            <a:pPr algn="ctr"/>
+            <a:r>
+              <a:rPr lang="en-US" u="sng" dirty="0" err="1" smtClean="0">
+                <a:solidFill>
+                  <a:schemeClr val="tx1"/>
+                </a:solidFill>
+              </a:rPr>
+              <a:t>login.php</a:t>
+            </a:r>
+            <a:endParaRPr lang="en-US" u="sng" dirty="0" smtClean="0">
+              <a:solidFill>
+                <a:schemeClr val="tx1"/>
+              </a:solidFill>
+            </a:endParaRPr>
+          </a:p>
+          <a:p>
+            <a:pPr algn="ctr"/>
+            <a:r>
+              <a:rPr lang="en-US" sz="1200" dirty="0" smtClean="0">
+                <a:solidFill>
+                  <a:schemeClr val="tx1"/>
+                </a:solidFill>
+              </a:rPr>
+              <a:t>&lt;</a:t>
+            </a:r>
+            <a:r>
+              <a:rPr lang="en-US" sz="1200" dirty="0" err="1" smtClean="0">
+                <a:solidFill>
+                  <a:schemeClr val="tx1"/>
+                </a:solidFill>
+              </a:rPr>
+              <a:t>nav</a:t>
+            </a:r>
+            <a:r>
+              <a:rPr lang="en-US" sz="1200" dirty="0" smtClean="0">
+                <a:solidFill>
+                  <a:schemeClr val="tx1"/>
+                </a:solidFill>
+              </a:rPr>
+              <a:t>&gt;</a:t>
+            </a:r>
+          </a:p>
+          <a:p>
+            <a:pPr algn="ctr"/>
+            <a:endParaRPr lang="en-US" sz="1200" dirty="0">
+              <a:solidFill>
+                <a:schemeClr val="tx1"/>
+              </a:solidFill>
+            </a:endParaRPr>
+          </a:p>
+          <a:p>
+            <a:pPr algn="ctr"/>
+            <a:r>
+              <a:rPr lang="en-US" sz="1200" dirty="0" smtClean="0">
+                <a:solidFill>
+                  <a:schemeClr val="tx1"/>
+                </a:solidFill>
+              </a:rPr>
+              <a:t>Enter username:</a:t>
+            </a:r>
+          </a:p>
+          <a:p>
+            <a:pPr algn="ctr"/>
+            <a:r>
+              <a:rPr lang="en-US" sz="1200" dirty="0" smtClean="0">
+                <a:solidFill>
+                  <a:schemeClr val="tx1"/>
+                </a:solidFill>
+              </a:rPr>
+              <a:t>Enter password:</a:t>
+            </a:r>
+            <a:endParaRPr lang="en-US" sz="1200" dirty="0">
+              <a:solidFill>
+                <a:schemeClr val="tx1"/>
+              </a:solidFill>
+            </a:endParaRPr>
+          </a:p>
+        </p:txBody>
+      </p:sp>
+      <p:sp>
+        <p:nvSpPr>
+          <p:cNvPr id="10" name="Rectangle 9"/>
+          <p:cNvSpPr/>
+          <p:nvPr/>
+        </p:nvSpPr>
+        <p:spPr>
+          <a:xfrm>
+            <a:off x="3241394" y="3903433"/>
+            <a:ext cx="2147187" cy="1113997"/>
+          </a:xfrm>
+          <a:prstGeom prst="rect">
+            <a:avLst/>
+          </a:prstGeom>
+          <a:noFill/>
+          <a:ln w="12700" cmpd="sng">
+            <a:solidFill>
+              <a:schemeClr val="tx1"/>
+            </a:solidFill>
+          </a:ln>
+        </p:spPr>
+        <p:style>
+          <a:lnRef idx="1">
+            <a:schemeClr val="accent1"/>
+          </a:lnRef>
+          <a:fillRef idx="3">
+            <a:schemeClr val="accent1"/>
+          </a:fillRef>
+          <a:effectRef idx="2">
+            <a:schemeClr val="accent1"/>
+          </a:effectRef>
+          <a:fontRef idx="minor">
+            <a:schemeClr val="lt1"/>
+          </a:fontRef>
+        </p:style>
+        <p:txBody>
+          <a:bodyPr rtlCol="0" anchor="ctr"/>
+          <a:lstStyle/>
+          <a:p>
+            <a:pPr algn="ctr"/>
+            <a:r>
+              <a:rPr lang="en-US" u="sng" dirty="0" err="1" smtClean="0">
+                <a:solidFill>
+                  <a:schemeClr val="tx1"/>
+                </a:solidFill>
+              </a:rPr>
+              <a:t>admin.php</a:t>
+            </a:r>
+            <a:endParaRPr lang="en-US" u="sng" dirty="0" smtClean="0">
+              <a:solidFill>
+                <a:schemeClr val="tx1"/>
+              </a:solidFill>
+            </a:endParaRPr>
+          </a:p>
+          <a:p>
+            <a:pPr algn="ctr"/>
+            <a:r>
+              <a:rPr lang="en-US" sz="1200" dirty="0" smtClean="0">
+                <a:solidFill>
+                  <a:schemeClr val="tx1"/>
+                </a:solidFill>
+              </a:rPr>
+              <a:t>&lt;</a:t>
+            </a:r>
+            <a:r>
+              <a:rPr lang="en-US" sz="1200" dirty="0" err="1" smtClean="0">
+                <a:solidFill>
+                  <a:schemeClr val="tx1"/>
+                </a:solidFill>
+              </a:rPr>
+              <a:t>nav</a:t>
+            </a:r>
+            <a:r>
+              <a:rPr lang="en-US" sz="1200" dirty="0" smtClean="0">
+                <a:solidFill>
+                  <a:schemeClr val="tx1"/>
+                </a:solidFill>
+              </a:rPr>
+              <a:t>&gt;</a:t>
+            </a:r>
+          </a:p>
+          <a:p>
+            <a:pPr algn="ctr"/>
+            <a:endParaRPr lang="en-US" sz="1200" dirty="0">
+              <a:solidFill>
+                <a:schemeClr val="tx1"/>
+              </a:solidFill>
+            </a:endParaRPr>
+          </a:p>
+          <a:p>
+            <a:pPr algn="ctr"/>
+            <a:r>
+              <a:rPr lang="en-US" sz="1200" dirty="0" smtClean="0">
+                <a:solidFill>
+                  <a:schemeClr val="tx1"/>
+                </a:solidFill>
+              </a:rPr>
+              <a:t>&lt;link to </a:t>
+            </a:r>
+            <a:r>
+              <a:rPr lang="en-US" sz="1200" dirty="0" err="1" smtClean="0">
+                <a:solidFill>
+                  <a:schemeClr val="tx1"/>
+                </a:solidFill>
+              </a:rPr>
+              <a:t>adminAdmin.php</a:t>
+            </a:r>
+            <a:r>
+              <a:rPr lang="en-US" sz="1200" dirty="0" smtClean="0">
+                <a:solidFill>
+                  <a:schemeClr val="tx1"/>
+                </a:solidFill>
+              </a:rPr>
+              <a:t>&gt;</a:t>
+            </a:r>
+            <a:endParaRPr lang="en-US" sz="1200" dirty="0">
+              <a:solidFill>
+                <a:schemeClr val="tx1"/>
+              </a:solidFill>
+            </a:endParaRPr>
+          </a:p>
+        </p:txBody>
+      </p:sp>
+      <p:sp>
+        <p:nvSpPr>
+          <p:cNvPr id="11" name="Rectangle 10"/>
+          <p:cNvSpPr/>
+          <p:nvPr/>
+        </p:nvSpPr>
+        <p:spPr>
+          <a:xfrm>
+            <a:off x="5802283" y="3546995"/>
+            <a:ext cx="2732498" cy="2025219"/>
+          </a:xfrm>
+          <a:prstGeom prst="rect">
+            <a:avLst/>
+          </a:prstGeom>
+          <a:noFill/>
+          <a:ln w="12700" cmpd="sng">
+            <a:solidFill>
+              <a:schemeClr val="tx1"/>
+            </a:solidFill>
+          </a:ln>
+        </p:spPr>
+        <p:style>
+          <a:lnRef idx="1">
+            <a:schemeClr val="accent1"/>
+          </a:lnRef>
+          <a:fillRef idx="3">
+            <a:schemeClr val="accent1"/>
+          </a:fillRef>
+          <a:effectRef idx="2">
+            <a:schemeClr val="accent1"/>
+          </a:effectRef>
+          <a:fontRef idx="minor">
+            <a:schemeClr val="lt1"/>
+          </a:fontRef>
+        </p:style>
+        <p:txBody>
+          <a:bodyPr rtlCol="0" anchor="ctr"/>
+          <a:lstStyle/>
+          <a:p>
+            <a:pPr algn="ctr"/>
+            <a:r>
+              <a:rPr lang="en-US" u="sng" dirty="0" err="1" smtClean="0">
+                <a:solidFill>
+                  <a:schemeClr val="tx1"/>
+                </a:solidFill>
+              </a:rPr>
+              <a:t>adminAdmin.php</a:t>
+            </a:r>
+            <a:endParaRPr lang="en-US" u="sng" dirty="0" smtClean="0">
+              <a:solidFill>
+                <a:schemeClr val="tx1"/>
+              </a:solidFill>
+            </a:endParaRPr>
+          </a:p>
+          <a:p>
+            <a:pPr algn="ctr"/>
+            <a:r>
+              <a:rPr lang="en-US" sz="1200" dirty="0" smtClean="0">
+                <a:solidFill>
+                  <a:schemeClr val="tx1"/>
+                </a:solidFill>
+              </a:rPr>
+              <a:t>&lt;</a:t>
+            </a:r>
+            <a:r>
+              <a:rPr lang="en-US" sz="1200" dirty="0" err="1" smtClean="0">
+                <a:solidFill>
+                  <a:schemeClr val="tx1"/>
+                </a:solidFill>
+              </a:rPr>
+              <a:t>nav</a:t>
+            </a:r>
+            <a:r>
+              <a:rPr lang="en-US" sz="1200" dirty="0" smtClean="0">
+                <a:solidFill>
+                  <a:schemeClr val="tx1"/>
+                </a:solidFill>
+              </a:rPr>
+              <a:t>&gt;</a:t>
+            </a:r>
+          </a:p>
+          <a:p>
+            <a:pPr algn="ctr"/>
+            <a:endParaRPr lang="en-US" sz="1200" dirty="0">
+              <a:solidFill>
+                <a:schemeClr val="tx1"/>
+              </a:solidFill>
+            </a:endParaRPr>
+          </a:p>
+          <a:p>
+            <a:pPr algn="ctr"/>
+            <a:r>
+              <a:rPr lang="en-US" sz="1200" dirty="0" smtClean="0">
+                <a:solidFill>
+                  <a:schemeClr val="tx1"/>
+                </a:solidFill>
+              </a:rPr>
+              <a:t>displays admin table</a:t>
+            </a:r>
+          </a:p>
+          <a:p>
+            <a:pPr algn="ctr"/>
+            <a:r>
+              <a:rPr lang="en-US" sz="1200" dirty="0" smtClean="0">
+                <a:solidFill>
+                  <a:schemeClr val="tx1"/>
+                </a:solidFill>
+              </a:rPr>
+              <a:t>radio buttons to select for update/delete</a:t>
+            </a:r>
+          </a:p>
+          <a:p>
+            <a:pPr algn="ctr"/>
+            <a:endParaRPr lang="en-US" sz="1200" dirty="0" smtClean="0">
+              <a:solidFill>
+                <a:schemeClr val="tx1"/>
+              </a:solidFill>
+            </a:endParaRPr>
+          </a:p>
+          <a:p>
+            <a:pPr algn="ctr"/>
+            <a:r>
+              <a:rPr lang="en-US" sz="1200" dirty="0" smtClean="0">
+                <a:solidFill>
+                  <a:schemeClr val="tx1"/>
+                </a:solidFill>
+              </a:rPr>
+              <a:t>update button</a:t>
+            </a:r>
+          </a:p>
+          <a:p>
+            <a:pPr algn="ctr"/>
+            <a:r>
+              <a:rPr lang="en-US" sz="1200" dirty="0" smtClean="0">
+                <a:solidFill>
+                  <a:schemeClr val="tx1"/>
+                </a:solidFill>
+              </a:rPr>
+              <a:t>delete button</a:t>
+            </a:r>
+          </a:p>
+          <a:p>
+            <a:pPr algn="ctr"/>
+            <a:r>
+              <a:rPr lang="en-US" sz="1200" dirty="0" smtClean="0">
+                <a:solidFill>
+                  <a:schemeClr val="tx1"/>
+                </a:solidFill>
+              </a:rPr>
+              <a:t>form to enter admin information</a:t>
+            </a:r>
+          </a:p>
+          <a:p>
+            <a:pPr algn="ctr"/>
+            <a:r>
+              <a:rPr lang="en-US" sz="1200" dirty="0" smtClean="0">
+                <a:solidFill>
+                  <a:schemeClr val="tx1"/>
+                </a:solidFill>
+              </a:rPr>
+              <a:t>submit to admin table</a:t>
+            </a:r>
+            <a:endParaRPr lang="en-US" sz="1200" dirty="0">
+              <a:solidFill>
+                <a:schemeClr val="tx1"/>
+              </a:solidFill>
+            </a:endParaRPr>
+          </a:p>
+        </p:txBody>
+      </p:sp>
+      <p:cxnSp>
+        <p:nvCxnSpPr>
+          <p:cNvPr id="13" name="Straight Arrow Connector 12"/>
+          <p:cNvCxnSpPr>
+            <a:stCxn id="9" idx="3"/>
+            <a:endCxn id="10" idx="1"/>
+          </p:cNvCxnSpPr>
+          <p:nvPr/>
+        </p:nvCxnSpPr>
+        <p:spPr>
+          <a:xfrm flipV="1">
+            <a:off x="2801142" y="4460432"/>
+            <a:ext cx="440252" cy="20187"/>
+          </a:xfrm>
+          <a:prstGeom prst="straightConnector1">
+            <a:avLst/>
+          </a:prstGeom>
+          <a:ln>
+            <a:tailEnd type="arrow"/>
+          </a:ln>
+        </p:spPr>
+        <p:style>
+          <a:lnRef idx="2">
+            <a:schemeClr val="accent1"/>
+          </a:lnRef>
+          <a:fillRef idx="0">
+            <a:schemeClr val="accent1"/>
+          </a:fillRef>
+          <a:effectRef idx="1">
+            <a:schemeClr val="accent1"/>
+          </a:effectRef>
+          <a:fontRef idx="minor">
+            <a:schemeClr val="tx1"/>
+          </a:fontRef>
+        </p:style>
+      </p:cxnSp>
+      <p:cxnSp>
+        <p:nvCxnSpPr>
+          <p:cNvPr id="16" name="Straight Arrow Connector 15"/>
+          <p:cNvCxnSpPr>
+            <a:stCxn id="10" idx="3"/>
+          </p:cNvCxnSpPr>
+          <p:nvPr/>
+        </p:nvCxnSpPr>
+        <p:spPr>
+          <a:xfrm>
+            <a:off x="5388581" y="4460432"/>
+            <a:ext cx="413702" cy="0"/>
+          </a:xfrm>
+          <a:prstGeom prst="straightConnector1">
+            <a:avLst/>
+          </a:prstGeom>
+          <a:ln>
+            <a:tailEnd type="arrow"/>
+          </a:ln>
+        </p:spPr>
+        <p:style>
+          <a:lnRef idx="2">
+            <a:schemeClr val="accent1"/>
+          </a:lnRef>
+          <a:fillRef idx="0">
+            <a:schemeClr val="accent1"/>
+          </a:fillRef>
+          <a:effectRef idx="1">
+            <a:schemeClr val="accent1"/>
+          </a:effectRef>
+          <a:fontRef idx="minor">
+            <a:schemeClr val="tx1"/>
+          </a:fontRef>
+        </p:style>
+      </p:cxnSp>
+      <p:cxnSp>
+        <p:nvCxnSpPr>
+          <p:cNvPr id="18" name="Straight Arrow Connector 17"/>
+          <p:cNvCxnSpPr>
+            <a:stCxn id="4" idx="1"/>
+          </p:cNvCxnSpPr>
+          <p:nvPr/>
+        </p:nvCxnSpPr>
+        <p:spPr>
+          <a:xfrm flipH="1">
+            <a:off x="2013568" y="726563"/>
+            <a:ext cx="1361445" cy="756755"/>
+          </a:xfrm>
+          <a:prstGeom prst="straightConnector1">
+            <a:avLst/>
+          </a:prstGeom>
+          <a:ln>
+            <a:tailEnd type="arrow"/>
+          </a:ln>
+        </p:spPr>
+        <p:style>
+          <a:lnRef idx="2">
+            <a:schemeClr val="accent1"/>
+          </a:lnRef>
+          <a:fillRef idx="0">
+            <a:schemeClr val="accent1"/>
+          </a:fillRef>
+          <a:effectRef idx="1">
+            <a:schemeClr val="accent1"/>
+          </a:effectRef>
+          <a:fontRef idx="minor">
+            <a:schemeClr val="tx1"/>
+          </a:fontRef>
+        </p:style>
+      </p:cxnSp>
+      <p:cxnSp>
+        <p:nvCxnSpPr>
+          <p:cNvPr id="20" name="Straight Arrow Connector 19"/>
+          <p:cNvCxnSpPr/>
+          <p:nvPr/>
+        </p:nvCxnSpPr>
+        <p:spPr>
+          <a:xfrm flipH="1">
+            <a:off x="3241394" y="1109867"/>
+            <a:ext cx="362435" cy="796799"/>
+          </a:xfrm>
+          <a:prstGeom prst="straightConnector1">
+            <a:avLst/>
+          </a:prstGeom>
+          <a:ln>
+            <a:tailEnd type="arrow"/>
+          </a:ln>
+        </p:spPr>
+        <p:style>
+          <a:lnRef idx="2">
+            <a:schemeClr val="accent1"/>
+          </a:lnRef>
+          <a:fillRef idx="0">
+            <a:schemeClr val="accent1"/>
+          </a:fillRef>
+          <a:effectRef idx="1">
+            <a:schemeClr val="accent1"/>
+          </a:effectRef>
+          <a:fontRef idx="minor">
+            <a:schemeClr val="tx1"/>
+          </a:fontRef>
+        </p:style>
+      </p:cxnSp>
+      <p:cxnSp>
+        <p:nvCxnSpPr>
+          <p:cNvPr id="22" name="Straight Arrow Connector 21"/>
+          <p:cNvCxnSpPr/>
+          <p:nvPr/>
+        </p:nvCxnSpPr>
+        <p:spPr>
+          <a:xfrm>
+            <a:off x="4759342" y="1109867"/>
+            <a:ext cx="91526" cy="655843"/>
+          </a:xfrm>
+          <a:prstGeom prst="straightConnector1">
+            <a:avLst/>
+          </a:prstGeom>
+          <a:ln>
+            <a:tailEnd type="arrow"/>
+          </a:ln>
+        </p:spPr>
+        <p:style>
+          <a:lnRef idx="2">
+            <a:schemeClr val="accent1"/>
+          </a:lnRef>
+          <a:fillRef idx="0">
+            <a:schemeClr val="accent1"/>
+          </a:fillRef>
+          <a:effectRef idx="1">
+            <a:schemeClr val="accent1"/>
+          </a:effectRef>
+          <a:fontRef idx="minor">
+            <a:schemeClr val="tx1"/>
+          </a:fontRef>
+        </p:style>
+      </p:cxnSp>
+      <p:cxnSp>
+        <p:nvCxnSpPr>
+          <p:cNvPr id="24" name="Straight Arrow Connector 23"/>
+          <p:cNvCxnSpPr>
+            <a:stCxn id="4" idx="3"/>
+          </p:cNvCxnSpPr>
+          <p:nvPr/>
+        </p:nvCxnSpPr>
+        <p:spPr>
+          <a:xfrm>
+            <a:off x="5388581" y="726563"/>
+            <a:ext cx="2219502" cy="924251"/>
+          </a:xfrm>
+          <a:prstGeom prst="straightConnector1">
+            <a:avLst/>
+          </a:prstGeom>
+          <a:ln>
+            <a:tailEnd type="arrow"/>
+          </a:ln>
+        </p:spPr>
+        <p:style>
+          <a:lnRef idx="2">
+            <a:schemeClr val="accent1"/>
+          </a:lnRef>
+          <a:fillRef idx="0">
+            <a:schemeClr val="accent1"/>
+          </a:fillRef>
+          <a:effectRef idx="1">
+            <a:schemeClr val="accent1"/>
+          </a:effectRef>
+          <a:fontRef idx="minor">
+            <a:schemeClr val="tx1"/>
+          </a:fontRef>
+        </p:style>
+      </p:cxnSp>
+      <p:cxnSp>
+        <p:nvCxnSpPr>
+          <p:cNvPr id="28" name="Straight Arrow Connector 27"/>
+          <p:cNvCxnSpPr/>
+          <p:nvPr/>
+        </p:nvCxnSpPr>
+        <p:spPr>
+          <a:xfrm flipH="1">
+            <a:off x="2245947" y="343258"/>
+            <a:ext cx="1129066" cy="3580362"/>
+          </a:xfrm>
+          <a:prstGeom prst="straightConnector1">
+            <a:avLst/>
+          </a:prstGeom>
+          <a:ln>
+            <a:tailEnd type="arrow"/>
+          </a:ln>
+        </p:spPr>
+        <p:style>
+          <a:lnRef idx="2">
+            <a:schemeClr val="accent1"/>
+          </a:lnRef>
+          <a:fillRef idx="0">
+            <a:schemeClr val="accent1"/>
+          </a:fillRef>
+          <a:effectRef idx="1">
+            <a:schemeClr val="accent1"/>
+          </a:effectRef>
+          <a:fontRef idx="minor">
+            <a:schemeClr val="tx1"/>
+          </a:fontRef>
+        </p:style>
+      </p:cxnSp>
+      <p:cxnSp>
+        <p:nvCxnSpPr>
+          <p:cNvPr id="33" name="Straight Arrow Connector 32"/>
+          <p:cNvCxnSpPr>
+            <a:stCxn id="4" idx="2"/>
+            <a:endCxn id="10" idx="0"/>
+          </p:cNvCxnSpPr>
+          <p:nvPr/>
+        </p:nvCxnSpPr>
+        <p:spPr>
+          <a:xfrm flipH="1">
+            <a:off x="4314988" y="1109867"/>
+            <a:ext cx="66809" cy="2793566"/>
+          </a:xfrm>
+          <a:prstGeom prst="straightConnector1">
+            <a:avLst/>
+          </a:prstGeom>
+          <a:ln>
+            <a:tailEnd type="arrow"/>
+          </a:ln>
+        </p:spPr>
+        <p:style>
+          <a:lnRef idx="2">
+            <a:schemeClr val="accent1"/>
+          </a:lnRef>
+          <a:fillRef idx="0">
+            <a:schemeClr val="accent1"/>
+          </a:fillRef>
+          <a:effectRef idx="1">
+            <a:schemeClr val="accent1"/>
+          </a:effectRef>
+          <a:fontRef idx="minor">
+            <a:schemeClr val="tx1"/>
+          </a:fontRef>
+        </p:style>
+      </p:cxnSp>
+      <p:cxnSp>
+        <p:nvCxnSpPr>
+          <p:cNvPr id="35" name="Straight Arrow Connector 34"/>
+          <p:cNvCxnSpPr/>
+          <p:nvPr/>
+        </p:nvCxnSpPr>
+        <p:spPr>
+          <a:xfrm>
+            <a:off x="5388581" y="1109867"/>
+            <a:ext cx="1995996" cy="2437128"/>
+          </a:xfrm>
+          <a:prstGeom prst="straightConnector1">
+            <a:avLst/>
+          </a:prstGeom>
+          <a:ln>
+            <a:tailEnd type="arrow"/>
+          </a:ln>
+        </p:spPr>
+        <p:style>
+          <a:lnRef idx="2">
+            <a:schemeClr val="accent1"/>
+          </a:lnRef>
+          <a:fillRef idx="0">
+            <a:schemeClr val="accent1"/>
+          </a:fillRef>
+          <a:effectRef idx="1">
+            <a:schemeClr val="accent1"/>
+          </a:effectRef>
+          <a:fontRef idx="minor">
+            <a:schemeClr val="tx1"/>
+          </a:fontRef>
+        </p:style>
+      </p:cxnSp>
+      <p:sp>
+        <p:nvSpPr>
+          <p:cNvPr id="37" name="Rectangle 36"/>
+          <p:cNvSpPr/>
+          <p:nvPr/>
+        </p:nvSpPr>
+        <p:spPr>
+          <a:xfrm>
+            <a:off x="3124327" y="5759583"/>
+            <a:ext cx="2147187" cy="695698"/>
+          </a:xfrm>
+          <a:prstGeom prst="rect">
+            <a:avLst/>
+          </a:prstGeom>
+          <a:solidFill>
+            <a:schemeClr val="bg1">
+              <a:lumMod val="85000"/>
+            </a:schemeClr>
+          </a:solidFill>
+          <a:ln w="12700" cmpd="sng">
+            <a:solidFill>
+              <a:schemeClr val="tx1"/>
+            </a:solidFill>
+          </a:ln>
+        </p:spPr>
+        <p:style>
+          <a:lnRef idx="1">
+            <a:schemeClr val="accent1"/>
+          </a:lnRef>
+          <a:fillRef idx="3">
+            <a:schemeClr val="accent1"/>
+          </a:fillRef>
+          <a:effectRef idx="2">
+            <a:schemeClr val="accent1"/>
+          </a:effectRef>
+          <a:fontRef idx="minor">
+            <a:schemeClr val="lt1"/>
+          </a:fontRef>
+        </p:style>
+        <p:txBody>
+          <a:bodyPr rtlCol="0" anchor="ctr"/>
+          <a:lstStyle/>
+          <a:p>
+            <a:pPr algn="ctr"/>
+            <a:r>
+              <a:rPr lang="en-US" b="1" u="sng" dirty="0" err="1" smtClean="0">
+                <a:solidFill>
+                  <a:schemeClr val="tx1"/>
+                </a:solidFill>
+              </a:rPr>
+              <a:t>style.css</a:t>
+            </a:r>
+            <a:endParaRPr lang="en-US" b="1" u="sng" dirty="0" smtClean="0">
+              <a:solidFill>
+                <a:schemeClr val="tx1"/>
+              </a:solidFill>
+            </a:endParaRPr>
+          </a:p>
+          <a:p>
+            <a:pPr algn="ctr"/>
+            <a:r>
+              <a:rPr lang="en-US" sz="1200" b="1" dirty="0" smtClean="0">
+                <a:solidFill>
+                  <a:schemeClr val="tx1"/>
+                </a:solidFill>
+              </a:rPr>
+              <a:t>style sheet</a:t>
+            </a:r>
+            <a:endParaRPr lang="en-US" sz="1200" b="1" dirty="0">
+              <a:solidFill>
+                <a:schemeClr val="tx1"/>
+              </a:solidFill>
+            </a:endParaRPr>
+          </a:p>
+        </p:txBody>
+      </p:sp>
+    </p:spTree>
+    <p:extLst>
+      <p:ext uri="{BB962C8B-B14F-4D97-AF65-F5344CB8AC3E}">
+        <p14:creationId xmlns:p14="http://schemas.microsoft.com/office/powerpoint/2010/main" val="4132967212"/>
       </p:ext>
     </p:extLst>
   </p:cSld>

</xml_diff>